<commit_message>
added documentation; tracking some necessary raw data for publication
</commit_message>
<xml_diff>
--- a/figures/figure_manual_edits.pptx
+++ b/figures/figure_manual_edits.pptx
@@ -4,8 +4,12 @@
   <p:sldMasterIdLst>
     <p:sldMasterId id="2147483684" r:id="rId1"/>
   </p:sldMasterIdLst>
+  <p:notesMasterIdLst>
+    <p:notesMasterId r:id="rId4"/>
+  </p:notesMasterIdLst>
   <p:sldIdLst>
     <p:sldId id="256" r:id="rId2"/>
+    <p:sldId id="420" r:id="rId3"/>
   </p:sldIdLst>
   <p:sldSz cx="7315200" cy="3657600"/>
   <p:notesSz cx="6858000" cy="9144000"/>
@@ -104,7 +108,477 @@
       </a:defRPr>
     </a:lvl9pPr>
   </p:defaultTextStyle>
+  <p:extLst>
+    <p:ext uri="{EFAFB233-063F-42B5-8137-9DF3F51BA10A}">
+      <p15:sldGuideLst xmlns:p15="http://schemas.microsoft.com/office/powerpoint/2012/main"/>
+    </p:ext>
+  </p:extLst>
 </p:presentation>
+</file>
+
+<file path=ppt/notesMasters/notesMaster1.xml><?xml version="1.0" encoding="utf-8"?>
+<p:notesMaster xmlns:a="http://schemas.openxmlformats.org/drawingml/2006/main" xmlns:r="http://schemas.openxmlformats.org/officeDocument/2006/relationships" xmlns:p="http://schemas.openxmlformats.org/presentationml/2006/main">
+  <p:cSld>
+    <p:bg>
+      <p:bgRef idx="1001">
+        <a:schemeClr val="bg1"/>
+      </p:bgRef>
+    </p:bg>
+    <p:spTree>
+      <p:nvGrpSpPr>
+        <p:cNvPr id="1" name=""/>
+        <p:cNvGrpSpPr/>
+        <p:nvPr/>
+      </p:nvGrpSpPr>
+      <p:grpSpPr>
+        <a:xfrm>
+          <a:off x="0" y="0"/>
+          <a:ext cx="0" cy="0"/>
+          <a:chOff x="0" y="0"/>
+          <a:chExt cx="0" cy="0"/>
+        </a:xfrm>
+      </p:grpSpPr>
+      <p:sp>
+        <p:nvSpPr>
+          <p:cNvPr id="2" name="Header Placeholder 1"/>
+          <p:cNvSpPr>
+            <a:spLocks noGrp="1"/>
+          </p:cNvSpPr>
+          <p:nvPr>
+            <p:ph type="hdr" sz="quarter"/>
+          </p:nvPr>
+        </p:nvSpPr>
+        <p:spPr>
+          <a:xfrm>
+            <a:off x="0" y="0"/>
+            <a:ext cx="2971800" cy="458788"/>
+          </a:xfrm>
+          <a:prstGeom prst="rect">
+            <a:avLst/>
+          </a:prstGeom>
+        </p:spPr>
+        <p:txBody>
+          <a:bodyPr vert="horz" lIns="91440" tIns="45720" rIns="91440" bIns="45720" rtlCol="0"/>
+          <a:lstStyle>
+            <a:lvl1pPr algn="l">
+              <a:defRPr sz="1200"/>
+            </a:lvl1pPr>
+          </a:lstStyle>
+          <a:p>
+            <a:endParaRPr lang="en-US"/>
+          </a:p>
+        </p:txBody>
+      </p:sp>
+      <p:sp>
+        <p:nvSpPr>
+          <p:cNvPr id="3" name="Date Placeholder 2"/>
+          <p:cNvSpPr>
+            <a:spLocks noGrp="1"/>
+          </p:cNvSpPr>
+          <p:nvPr>
+            <p:ph type="dt" idx="1"/>
+          </p:nvPr>
+        </p:nvSpPr>
+        <p:spPr>
+          <a:xfrm>
+            <a:off x="3884613" y="0"/>
+            <a:ext cx="2971800" cy="458788"/>
+          </a:xfrm>
+          <a:prstGeom prst="rect">
+            <a:avLst/>
+          </a:prstGeom>
+        </p:spPr>
+        <p:txBody>
+          <a:bodyPr vert="horz" lIns="91440" tIns="45720" rIns="91440" bIns="45720" rtlCol="0"/>
+          <a:lstStyle>
+            <a:lvl1pPr algn="r">
+              <a:defRPr sz="1200"/>
+            </a:lvl1pPr>
+          </a:lstStyle>
+          <a:p>
+            <a:fld id="{DE35465E-B844-1845-97EA-6363B48C251A}" type="datetimeFigureOut">
+              <a:rPr lang="en-US" smtClean="0"/>
+              <a:t>9/17/24</a:t>
+            </a:fld>
+            <a:endParaRPr lang="en-US"/>
+          </a:p>
+        </p:txBody>
+      </p:sp>
+      <p:sp>
+        <p:nvSpPr>
+          <p:cNvPr id="4" name="Slide Image Placeholder 3"/>
+          <p:cNvSpPr>
+            <a:spLocks noGrp="1" noRot="1" noChangeAspect="1"/>
+          </p:cNvSpPr>
+          <p:nvPr>
+            <p:ph type="sldImg" idx="2"/>
+          </p:nvPr>
+        </p:nvSpPr>
+        <p:spPr>
+          <a:xfrm>
+            <a:off x="342900" y="1143000"/>
+            <a:ext cx="6172200" cy="3086100"/>
+          </a:xfrm>
+          <a:prstGeom prst="rect">
+            <a:avLst/>
+          </a:prstGeom>
+          <a:noFill/>
+          <a:ln w="12700">
+            <a:solidFill>
+              <a:prstClr val="black"/>
+            </a:solidFill>
+          </a:ln>
+        </p:spPr>
+        <p:txBody>
+          <a:bodyPr vert="horz" lIns="91440" tIns="45720" rIns="91440" bIns="45720" rtlCol="0" anchor="ctr"/>
+          <a:lstStyle/>
+          <a:p>
+            <a:endParaRPr lang="en-US"/>
+          </a:p>
+        </p:txBody>
+      </p:sp>
+      <p:sp>
+        <p:nvSpPr>
+          <p:cNvPr id="5" name="Notes Placeholder 4"/>
+          <p:cNvSpPr>
+            <a:spLocks noGrp="1"/>
+          </p:cNvSpPr>
+          <p:nvPr>
+            <p:ph type="body" sz="quarter" idx="3"/>
+          </p:nvPr>
+        </p:nvSpPr>
+        <p:spPr>
+          <a:xfrm>
+            <a:off x="685800" y="4400550"/>
+            <a:ext cx="5486400" cy="3600450"/>
+          </a:xfrm>
+          <a:prstGeom prst="rect">
+            <a:avLst/>
+          </a:prstGeom>
+        </p:spPr>
+        <p:txBody>
+          <a:bodyPr vert="horz" lIns="91440" tIns="45720" rIns="91440" bIns="45720" rtlCol="0"/>
+          <a:lstStyle/>
+          <a:p>
+            <a:pPr lvl="0"/>
+            <a:r>
+              <a:rPr lang="en-US"/>
+              <a:t>Click to edit Master text styles</a:t>
+            </a:r>
+          </a:p>
+          <a:p>
+            <a:pPr lvl="1"/>
+            <a:r>
+              <a:rPr lang="en-US"/>
+              <a:t>Second level</a:t>
+            </a:r>
+          </a:p>
+          <a:p>
+            <a:pPr lvl="2"/>
+            <a:r>
+              <a:rPr lang="en-US"/>
+              <a:t>Third level</a:t>
+            </a:r>
+          </a:p>
+          <a:p>
+            <a:pPr lvl="3"/>
+            <a:r>
+              <a:rPr lang="en-US"/>
+              <a:t>Fourth level</a:t>
+            </a:r>
+          </a:p>
+          <a:p>
+            <a:pPr lvl="4"/>
+            <a:r>
+              <a:rPr lang="en-US"/>
+              <a:t>Fifth level</a:t>
+            </a:r>
+          </a:p>
+        </p:txBody>
+      </p:sp>
+      <p:sp>
+        <p:nvSpPr>
+          <p:cNvPr id="6" name="Footer Placeholder 5"/>
+          <p:cNvSpPr>
+            <a:spLocks noGrp="1"/>
+          </p:cNvSpPr>
+          <p:nvPr>
+            <p:ph type="ftr" sz="quarter" idx="4"/>
+          </p:nvPr>
+        </p:nvSpPr>
+        <p:spPr>
+          <a:xfrm>
+            <a:off x="0" y="8685213"/>
+            <a:ext cx="2971800" cy="458787"/>
+          </a:xfrm>
+          <a:prstGeom prst="rect">
+            <a:avLst/>
+          </a:prstGeom>
+        </p:spPr>
+        <p:txBody>
+          <a:bodyPr vert="horz" lIns="91440" tIns="45720" rIns="91440" bIns="45720" rtlCol="0" anchor="b"/>
+          <a:lstStyle>
+            <a:lvl1pPr algn="l">
+              <a:defRPr sz="1200"/>
+            </a:lvl1pPr>
+          </a:lstStyle>
+          <a:p>
+            <a:endParaRPr lang="en-US"/>
+          </a:p>
+        </p:txBody>
+      </p:sp>
+      <p:sp>
+        <p:nvSpPr>
+          <p:cNvPr id="7" name="Slide Number Placeholder 6"/>
+          <p:cNvSpPr>
+            <a:spLocks noGrp="1"/>
+          </p:cNvSpPr>
+          <p:nvPr>
+            <p:ph type="sldNum" sz="quarter" idx="5"/>
+          </p:nvPr>
+        </p:nvSpPr>
+        <p:spPr>
+          <a:xfrm>
+            <a:off x="3884613" y="8685213"/>
+            <a:ext cx="2971800" cy="458787"/>
+          </a:xfrm>
+          <a:prstGeom prst="rect">
+            <a:avLst/>
+          </a:prstGeom>
+        </p:spPr>
+        <p:txBody>
+          <a:bodyPr vert="horz" lIns="91440" tIns="45720" rIns="91440" bIns="45720" rtlCol="0" anchor="b"/>
+          <a:lstStyle>
+            <a:lvl1pPr algn="r">
+              <a:defRPr sz="1200"/>
+            </a:lvl1pPr>
+          </a:lstStyle>
+          <a:p>
+            <a:fld id="{3541F5F5-17A1-3F44-BC6B-21764F5279E0}" type="slidenum">
+              <a:rPr lang="en-US" smtClean="0"/>
+              <a:t>‹#›</a:t>
+            </a:fld>
+            <a:endParaRPr lang="en-US"/>
+          </a:p>
+        </p:txBody>
+      </p:sp>
+    </p:spTree>
+    <p:extLst>
+      <p:ext uri="{BB962C8B-B14F-4D97-AF65-F5344CB8AC3E}">
+        <p14:creationId xmlns:p14="http://schemas.microsoft.com/office/powerpoint/2010/main" val="3826845971"/>
+      </p:ext>
+    </p:extLst>
+  </p:cSld>
+  <p:clrMap bg1="lt1" tx1="dk1" bg2="lt2" tx2="dk2" accent1="accent1" accent2="accent2" accent3="accent3" accent4="accent4" accent5="accent5" accent6="accent6" hlink="hlink" folHlink="folHlink"/>
+  <p:notesStyle>
+    <a:lvl1pPr marL="0" algn="l" defTabSz="914400" rtl="0" eaLnBrk="1" latinLnBrk="0" hangingPunct="1">
+      <a:defRPr sz="1200" kern="1200">
+        <a:solidFill>
+          <a:schemeClr val="tx1"/>
+        </a:solidFill>
+        <a:latin typeface="+mn-lt"/>
+        <a:ea typeface="+mn-ea"/>
+        <a:cs typeface="+mn-cs"/>
+      </a:defRPr>
+    </a:lvl1pPr>
+    <a:lvl2pPr marL="457200" algn="l" defTabSz="914400" rtl="0" eaLnBrk="1" latinLnBrk="0" hangingPunct="1">
+      <a:defRPr sz="1200" kern="1200">
+        <a:solidFill>
+          <a:schemeClr val="tx1"/>
+        </a:solidFill>
+        <a:latin typeface="+mn-lt"/>
+        <a:ea typeface="+mn-ea"/>
+        <a:cs typeface="+mn-cs"/>
+      </a:defRPr>
+    </a:lvl2pPr>
+    <a:lvl3pPr marL="914400" algn="l" defTabSz="914400" rtl="0" eaLnBrk="1" latinLnBrk="0" hangingPunct="1">
+      <a:defRPr sz="1200" kern="1200">
+        <a:solidFill>
+          <a:schemeClr val="tx1"/>
+        </a:solidFill>
+        <a:latin typeface="+mn-lt"/>
+        <a:ea typeface="+mn-ea"/>
+        <a:cs typeface="+mn-cs"/>
+      </a:defRPr>
+    </a:lvl3pPr>
+    <a:lvl4pPr marL="1371600" algn="l" defTabSz="914400" rtl="0" eaLnBrk="1" latinLnBrk="0" hangingPunct="1">
+      <a:defRPr sz="1200" kern="1200">
+        <a:solidFill>
+          <a:schemeClr val="tx1"/>
+        </a:solidFill>
+        <a:latin typeface="+mn-lt"/>
+        <a:ea typeface="+mn-ea"/>
+        <a:cs typeface="+mn-cs"/>
+      </a:defRPr>
+    </a:lvl4pPr>
+    <a:lvl5pPr marL="1828800" algn="l" defTabSz="914400" rtl="0" eaLnBrk="1" latinLnBrk="0" hangingPunct="1">
+      <a:defRPr sz="1200" kern="1200">
+        <a:solidFill>
+          <a:schemeClr val="tx1"/>
+        </a:solidFill>
+        <a:latin typeface="+mn-lt"/>
+        <a:ea typeface="+mn-ea"/>
+        <a:cs typeface="+mn-cs"/>
+      </a:defRPr>
+    </a:lvl5pPr>
+    <a:lvl6pPr marL="2286000" algn="l" defTabSz="914400" rtl="0" eaLnBrk="1" latinLnBrk="0" hangingPunct="1">
+      <a:defRPr sz="1200" kern="1200">
+        <a:solidFill>
+          <a:schemeClr val="tx1"/>
+        </a:solidFill>
+        <a:latin typeface="+mn-lt"/>
+        <a:ea typeface="+mn-ea"/>
+        <a:cs typeface="+mn-cs"/>
+      </a:defRPr>
+    </a:lvl6pPr>
+    <a:lvl7pPr marL="2743200" algn="l" defTabSz="914400" rtl="0" eaLnBrk="1" latinLnBrk="0" hangingPunct="1">
+      <a:defRPr sz="1200" kern="1200">
+        <a:solidFill>
+          <a:schemeClr val="tx1"/>
+        </a:solidFill>
+        <a:latin typeface="+mn-lt"/>
+        <a:ea typeface="+mn-ea"/>
+        <a:cs typeface="+mn-cs"/>
+      </a:defRPr>
+    </a:lvl7pPr>
+    <a:lvl8pPr marL="3200400" algn="l" defTabSz="914400" rtl="0" eaLnBrk="1" latinLnBrk="0" hangingPunct="1">
+      <a:defRPr sz="1200" kern="1200">
+        <a:solidFill>
+          <a:schemeClr val="tx1"/>
+        </a:solidFill>
+        <a:latin typeface="+mn-lt"/>
+        <a:ea typeface="+mn-ea"/>
+        <a:cs typeface="+mn-cs"/>
+      </a:defRPr>
+    </a:lvl8pPr>
+    <a:lvl9pPr marL="3657600" algn="l" defTabSz="914400" rtl="0" eaLnBrk="1" latinLnBrk="0" hangingPunct="1">
+      <a:defRPr sz="1200" kern="1200">
+        <a:solidFill>
+          <a:schemeClr val="tx1"/>
+        </a:solidFill>
+        <a:latin typeface="+mn-lt"/>
+        <a:ea typeface="+mn-ea"/>
+        <a:cs typeface="+mn-cs"/>
+      </a:defRPr>
+    </a:lvl9pPr>
+  </p:notesStyle>
+</p:notesMaster>
+</file>
+
+<file path=ppt/notesSlides/notesSlide1.xml><?xml version="1.0" encoding="utf-8"?>
+<p:notes xmlns:a="http://schemas.openxmlformats.org/drawingml/2006/main" xmlns:r="http://schemas.openxmlformats.org/officeDocument/2006/relationships" xmlns:p="http://schemas.openxmlformats.org/presentationml/2006/main">
+  <p:cSld>
+    <p:spTree>
+      <p:nvGrpSpPr>
+        <p:cNvPr id="1" name="">
+          <a:extLst>
+            <a:ext uri="{FF2B5EF4-FFF2-40B4-BE49-F238E27FC236}">
+              <a16:creationId xmlns:a16="http://schemas.microsoft.com/office/drawing/2014/main" id="{DAD293A7-9DF4-C232-80AC-43ED2AD8B75F}"/>
+            </a:ext>
+          </a:extLst>
+        </p:cNvPr>
+        <p:cNvGrpSpPr/>
+        <p:nvPr/>
+      </p:nvGrpSpPr>
+      <p:grpSpPr>
+        <a:xfrm>
+          <a:off x="0" y="0"/>
+          <a:ext cx="0" cy="0"/>
+          <a:chOff x="0" y="0"/>
+          <a:chExt cx="0" cy="0"/>
+        </a:xfrm>
+      </p:grpSpPr>
+      <p:sp>
+        <p:nvSpPr>
+          <p:cNvPr id="2" name="Slide Image Placeholder 1">
+            <a:extLst>
+              <a:ext uri="{FF2B5EF4-FFF2-40B4-BE49-F238E27FC236}">
+                <a16:creationId xmlns:a16="http://schemas.microsoft.com/office/drawing/2014/main" id="{F25BCD5B-581B-1B57-A9DD-9D7ECB1F0304}"/>
+              </a:ext>
+            </a:extLst>
+          </p:cNvPr>
+          <p:cNvSpPr>
+            <a:spLocks noGrp="1" noRot="1" noChangeAspect="1"/>
+          </p:cNvSpPr>
+          <p:nvPr>
+            <p:ph type="sldImg"/>
+          </p:nvPr>
+        </p:nvSpPr>
+        <p:spPr/>
+      </p:sp>
+      <p:sp>
+        <p:nvSpPr>
+          <p:cNvPr id="3" name="Notes Placeholder 2">
+            <a:extLst>
+              <a:ext uri="{FF2B5EF4-FFF2-40B4-BE49-F238E27FC236}">
+                <a16:creationId xmlns:a16="http://schemas.microsoft.com/office/drawing/2014/main" id="{F8D25884-3987-D5B7-05E5-424BA917DE2A}"/>
+              </a:ext>
+            </a:extLst>
+          </p:cNvPr>
+          <p:cNvSpPr>
+            <a:spLocks noGrp="1"/>
+          </p:cNvSpPr>
+          <p:nvPr>
+            <p:ph type="body" idx="1"/>
+          </p:nvPr>
+        </p:nvSpPr>
+        <p:spPr/>
+        <p:txBody>
+          <a:bodyPr/>
+          <a:lstStyle/>
+          <a:p>
+            <a:r>
+              <a:rPr lang="en-US" sz="1800" kern="0" dirty="0">
+                <a:effectLst/>
+                <a:latin typeface="Times New Roman" panose="02020603050405020304" pitchFamily="18" charset="0"/>
+                <a:ea typeface="Times New Roman" panose="02020603050405020304" pitchFamily="18" charset="0"/>
+              </a:rPr>
+              <a:t>Pulse-level covariates</a:t>
+            </a:r>
+            <a:endParaRPr lang="en-US" dirty="0"/>
+          </a:p>
+        </p:txBody>
+      </p:sp>
+      <p:sp>
+        <p:nvSpPr>
+          <p:cNvPr id="4" name="Slide Number Placeholder 3">
+            <a:extLst>
+              <a:ext uri="{FF2B5EF4-FFF2-40B4-BE49-F238E27FC236}">
+                <a16:creationId xmlns:a16="http://schemas.microsoft.com/office/drawing/2014/main" id="{80448B03-467D-69CD-90AA-AF16B41FFAFE}"/>
+              </a:ext>
+            </a:extLst>
+          </p:cNvPr>
+          <p:cNvSpPr>
+            <a:spLocks noGrp="1"/>
+          </p:cNvSpPr>
+          <p:nvPr>
+            <p:ph type="sldNum" sz="quarter" idx="5"/>
+          </p:nvPr>
+        </p:nvSpPr>
+        <p:spPr/>
+        <p:txBody>
+          <a:bodyPr/>
+          <a:lstStyle/>
+          <a:p>
+            <a:fld id="{AA713B35-C5F7-9C4B-B6F7-4E893B56E1B4}" type="slidenum">
+              <a:rPr lang="en-US" smtClean="0"/>
+              <a:t>2</a:t>
+            </a:fld>
+            <a:endParaRPr lang="en-US" dirty="0"/>
+          </a:p>
+        </p:txBody>
+      </p:sp>
+    </p:spTree>
+    <p:extLst>
+      <p:ext uri="{BB962C8B-B14F-4D97-AF65-F5344CB8AC3E}">
+        <p14:creationId xmlns:p14="http://schemas.microsoft.com/office/powerpoint/2010/main" val="367567159"/>
+      </p:ext>
+    </p:extLst>
+  </p:cSld>
+  <p:clrMapOvr>
+    <a:masterClrMapping/>
+  </p:clrMapOvr>
+</p:notes>
 </file>
 
 <file path=ppt/slideLayouts/slideLayout1.xml><?xml version="1.0" encoding="utf-8"?>
@@ -238,7 +712,7 @@
           <a:p>
             <a:fld id="{9E10C808-DD6F-3347-B3C1-2A8C06EC455D}" type="datetimeFigureOut">
               <a:rPr lang="en-US" smtClean="0"/>
-              <a:t>4/27/24</a:t>
+              <a:t>9/17/24</a:t>
             </a:fld>
             <a:endParaRPr lang="en-US"/>
           </a:p>
@@ -408,7 +882,7 @@
           <a:p>
             <a:fld id="{9E10C808-DD6F-3347-B3C1-2A8C06EC455D}" type="datetimeFigureOut">
               <a:rPr lang="en-US" smtClean="0"/>
-              <a:t>4/27/24</a:t>
+              <a:t>9/17/24</a:t>
             </a:fld>
             <a:endParaRPr lang="en-US"/>
           </a:p>
@@ -588,7 +1062,7 @@
           <a:p>
             <a:fld id="{9E10C808-DD6F-3347-B3C1-2A8C06EC455D}" type="datetimeFigureOut">
               <a:rPr lang="en-US" smtClean="0"/>
-              <a:t>4/27/24</a:t>
+              <a:t>9/17/24</a:t>
             </a:fld>
             <a:endParaRPr lang="en-US"/>
           </a:p>
@@ -758,7 +1232,7 @@
           <a:p>
             <a:fld id="{9E10C808-DD6F-3347-B3C1-2A8C06EC455D}" type="datetimeFigureOut">
               <a:rPr lang="en-US" smtClean="0"/>
-              <a:t>4/27/24</a:t>
+              <a:t>9/17/24</a:t>
             </a:fld>
             <a:endParaRPr lang="en-US"/>
           </a:p>
@@ -1004,7 +1478,7 @@
           <a:p>
             <a:fld id="{9E10C808-DD6F-3347-B3C1-2A8C06EC455D}" type="datetimeFigureOut">
               <a:rPr lang="en-US" smtClean="0"/>
-              <a:t>4/27/24</a:t>
+              <a:t>9/17/24</a:t>
             </a:fld>
             <a:endParaRPr lang="en-US"/>
           </a:p>
@@ -1236,7 +1710,7 @@
           <a:p>
             <a:fld id="{9E10C808-DD6F-3347-B3C1-2A8C06EC455D}" type="datetimeFigureOut">
               <a:rPr lang="en-US" smtClean="0"/>
-              <a:t>4/27/24</a:t>
+              <a:t>9/17/24</a:t>
             </a:fld>
             <a:endParaRPr lang="en-US"/>
           </a:p>
@@ -1603,7 +2077,7 @@
           <a:p>
             <a:fld id="{9E10C808-DD6F-3347-B3C1-2A8C06EC455D}" type="datetimeFigureOut">
               <a:rPr lang="en-US" smtClean="0"/>
-              <a:t>4/27/24</a:t>
+              <a:t>9/17/24</a:t>
             </a:fld>
             <a:endParaRPr lang="en-US"/>
           </a:p>
@@ -1721,7 +2195,7 @@
           <a:p>
             <a:fld id="{9E10C808-DD6F-3347-B3C1-2A8C06EC455D}" type="datetimeFigureOut">
               <a:rPr lang="en-US" smtClean="0"/>
-              <a:t>4/27/24</a:t>
+              <a:t>9/17/24</a:t>
             </a:fld>
             <a:endParaRPr lang="en-US"/>
           </a:p>
@@ -1816,7 +2290,7 @@
           <a:p>
             <a:fld id="{9E10C808-DD6F-3347-B3C1-2A8C06EC455D}" type="datetimeFigureOut">
               <a:rPr lang="en-US" smtClean="0"/>
-              <a:t>4/27/24</a:t>
+              <a:t>9/17/24</a:t>
             </a:fld>
             <a:endParaRPr lang="en-US"/>
           </a:p>
@@ -2093,7 +2567,7 @@
           <a:p>
             <a:fld id="{9E10C808-DD6F-3347-B3C1-2A8C06EC455D}" type="datetimeFigureOut">
               <a:rPr lang="en-US" smtClean="0"/>
-              <a:t>4/27/24</a:t>
+              <a:t>9/17/24</a:t>
             </a:fld>
             <a:endParaRPr lang="en-US"/>
           </a:p>
@@ -2350,7 +2824,7 @@
           <a:p>
             <a:fld id="{9E10C808-DD6F-3347-B3C1-2A8C06EC455D}" type="datetimeFigureOut">
               <a:rPr lang="en-US" smtClean="0"/>
-              <a:t>4/27/24</a:t>
+              <a:t>9/17/24</a:t>
             </a:fld>
             <a:endParaRPr lang="en-US"/>
           </a:p>
@@ -2563,7 +3037,7 @@
           <a:p>
             <a:fld id="{9E10C808-DD6F-3347-B3C1-2A8C06EC455D}" type="datetimeFigureOut">
               <a:rPr lang="en-US" smtClean="0"/>
-              <a:t>4/27/24</a:t>
+              <a:t>9/17/24</a:t>
             </a:fld>
             <a:endParaRPr lang="en-US"/>
           </a:p>
@@ -2970,10 +3444,10 @@
       </p:grpSpPr>
       <p:pic>
         <p:nvPicPr>
-          <p:cNvPr id="5" name="Picture 4" descr="A graph of different colored squares&#10;&#10;Description automatically generated with medium confidence">
+          <p:cNvPr id="3" name="Picture 2" descr="A graph of different colored squares&#10;&#10;Description automatically generated">
             <a:extLst>
               <a:ext uri="{FF2B5EF4-FFF2-40B4-BE49-F238E27FC236}">
-                <a16:creationId xmlns:a16="http://schemas.microsoft.com/office/drawing/2014/main" id="{E79156C2-4A56-6B97-FC07-87E75D0D0DD5}"/>
+                <a16:creationId xmlns:a16="http://schemas.microsoft.com/office/drawing/2014/main" id="{24E8BAF2-DAD2-B0D5-20DF-B024AB6EB382}"/>
               </a:ext>
             </a:extLst>
           </p:cNvPr>
@@ -3111,8 +3585,8 @@
           <p:nvPr/>
         </p:nvSpPr>
         <p:spPr>
-          <a:xfrm>
-            <a:off x="1875129" y="847500"/>
+          <a:xfrm rot="20917571">
+            <a:off x="1879798" y="780502"/>
             <a:ext cx="641267" cy="113035"/>
           </a:xfrm>
           <a:custGeom>
@@ -3287,10 +3761,1344 @@
           </a:fontRef>
         </p:style>
       </p:cxnSp>
+      <p:sp>
+        <p:nvSpPr>
+          <p:cNvPr id="4" name="TextBox 3">
+            <a:extLst>
+              <a:ext uri="{FF2B5EF4-FFF2-40B4-BE49-F238E27FC236}">
+                <a16:creationId xmlns:a16="http://schemas.microsoft.com/office/drawing/2014/main" id="{97D2A664-F045-9896-449D-88E8C8B90695}"/>
+              </a:ext>
+            </a:extLst>
+          </p:cNvPr>
+          <p:cNvSpPr txBox="1"/>
+          <p:nvPr/>
+        </p:nvSpPr>
+        <p:spPr>
+          <a:xfrm>
+            <a:off x="495837" y="6440"/>
+            <a:ext cx="641267" cy="369332"/>
+          </a:xfrm>
+          <a:prstGeom prst="rect">
+            <a:avLst/>
+          </a:prstGeom>
+          <a:noFill/>
+        </p:spPr>
+        <p:txBody>
+          <a:bodyPr wrap="square" rtlCol="0">
+            <a:spAutoFit/>
+          </a:bodyPr>
+          <a:lstStyle/>
+          <a:p>
+            <a:r>
+              <a:rPr lang="en-US" dirty="0">
+                <a:latin typeface="Helvetica" pitchFamily="2" charset="0"/>
+              </a:rPr>
+              <a:t>(A)</a:t>
+            </a:r>
+          </a:p>
+        </p:txBody>
+      </p:sp>
+      <p:sp>
+        <p:nvSpPr>
+          <p:cNvPr id="8" name="TextBox 7">
+            <a:extLst>
+              <a:ext uri="{FF2B5EF4-FFF2-40B4-BE49-F238E27FC236}">
+                <a16:creationId xmlns:a16="http://schemas.microsoft.com/office/drawing/2014/main" id="{994C544E-B087-5865-B445-227A05695B72}"/>
+              </a:ext>
+            </a:extLst>
+          </p:cNvPr>
+          <p:cNvSpPr txBox="1"/>
+          <p:nvPr/>
+        </p:nvSpPr>
+        <p:spPr>
+          <a:xfrm>
+            <a:off x="4183487" y="6440"/>
+            <a:ext cx="697606" cy="369332"/>
+          </a:xfrm>
+          <a:prstGeom prst="rect">
+            <a:avLst/>
+          </a:prstGeom>
+          <a:noFill/>
+        </p:spPr>
+        <p:txBody>
+          <a:bodyPr wrap="square" rtlCol="0">
+            <a:spAutoFit/>
+          </a:bodyPr>
+          <a:lstStyle/>
+          <a:p>
+            <a:r>
+              <a:rPr lang="en-US" dirty="0">
+                <a:latin typeface="Helvetica" pitchFamily="2" charset="0"/>
+              </a:rPr>
+              <a:t>(B)</a:t>
+            </a:r>
+          </a:p>
+        </p:txBody>
+      </p:sp>
     </p:spTree>
     <p:extLst>
       <p:ext uri="{BB962C8B-B14F-4D97-AF65-F5344CB8AC3E}">
         <p14:creationId xmlns:p14="http://schemas.microsoft.com/office/powerpoint/2010/main" val="1967135800"/>
+      </p:ext>
+    </p:extLst>
+  </p:cSld>
+  <p:clrMapOvr>
+    <a:masterClrMapping/>
+  </p:clrMapOvr>
+</p:sld>
+</file>
+
+<file path=ppt/slides/slide2.xml><?xml version="1.0" encoding="utf-8"?>
+<p:sld xmlns:a="http://schemas.openxmlformats.org/drawingml/2006/main" xmlns:r="http://schemas.openxmlformats.org/officeDocument/2006/relationships" xmlns:p="http://schemas.openxmlformats.org/presentationml/2006/main">
+  <p:cSld>
+    <p:spTree>
+      <p:nvGrpSpPr>
+        <p:cNvPr id="1" name="">
+          <a:extLst>
+            <a:ext uri="{FF2B5EF4-FFF2-40B4-BE49-F238E27FC236}">
+              <a16:creationId xmlns:a16="http://schemas.microsoft.com/office/drawing/2014/main" id="{BB79D775-FB38-FF9B-1EE5-94D847CD5073}"/>
+            </a:ext>
+          </a:extLst>
+        </p:cNvPr>
+        <p:cNvGrpSpPr/>
+        <p:nvPr/>
+      </p:nvGrpSpPr>
+      <p:grpSpPr>
+        <a:xfrm>
+          <a:off x="0" y="0"/>
+          <a:ext cx="0" cy="0"/>
+          <a:chOff x="0" y="0"/>
+          <a:chExt cx="0" cy="0"/>
+        </a:xfrm>
+      </p:grpSpPr>
+      <p:pic>
+        <p:nvPicPr>
+          <p:cNvPr id="3" name="Picture 2" descr="A screenshot of a computer&#10;&#10;Description automatically generated">
+            <a:extLst>
+              <a:ext uri="{FF2B5EF4-FFF2-40B4-BE49-F238E27FC236}">
+                <a16:creationId xmlns:a16="http://schemas.microsoft.com/office/drawing/2014/main" id="{59B175B4-77CA-948C-325C-62A9C3B8E7A6}"/>
+              </a:ext>
+            </a:extLst>
+          </p:cNvPr>
+          <p:cNvPicPr>
+            <a:picLocks noChangeAspect="1"/>
+          </p:cNvPicPr>
+          <p:nvPr/>
+        </p:nvPicPr>
+        <p:blipFill>
+          <a:blip r:embed="rId3" cstate="print">
+            <a:extLst>
+              <a:ext uri="{28A0092B-C50C-407E-A947-70E740481C1C}">
+                <a14:useLocalDpi xmlns:a14="http://schemas.microsoft.com/office/drawing/2010/main" val="0"/>
+              </a:ext>
+            </a:extLst>
+          </a:blip>
+          <a:srcRect t="6364" r="787"/>
+          <a:stretch/>
+        </p:blipFill>
+        <p:spPr>
+          <a:xfrm>
+            <a:off x="2092734" y="243856"/>
+            <a:ext cx="3327956" cy="3413745"/>
+          </a:xfrm>
+          <a:prstGeom prst="rect">
+            <a:avLst/>
+          </a:prstGeom>
+        </p:spPr>
+      </p:pic>
+      <p:sp>
+        <p:nvSpPr>
+          <p:cNvPr id="7" name="Rectangle 6">
+            <a:extLst>
+              <a:ext uri="{FF2B5EF4-FFF2-40B4-BE49-F238E27FC236}">
+                <a16:creationId xmlns:a16="http://schemas.microsoft.com/office/drawing/2014/main" id="{FB962724-BE6A-5D17-1F09-08DBD284D829}"/>
+              </a:ext>
+            </a:extLst>
+          </p:cNvPr>
+          <p:cNvSpPr/>
+          <p:nvPr/>
+        </p:nvSpPr>
+        <p:spPr>
+          <a:xfrm>
+            <a:off x="3993445" y="2324100"/>
+            <a:ext cx="1371600" cy="1321634"/>
+          </a:xfrm>
+          <a:prstGeom prst="rect">
+            <a:avLst/>
+          </a:prstGeom>
+          <a:solidFill>
+            <a:schemeClr val="bg1"/>
+          </a:solidFill>
+          <a:ln>
+            <a:solidFill>
+              <a:schemeClr val="bg1"/>
+            </a:solidFill>
+          </a:ln>
+        </p:spPr>
+        <p:style>
+          <a:lnRef idx="2">
+            <a:schemeClr val="accent1">
+              <a:shade val="15000"/>
+            </a:schemeClr>
+          </a:lnRef>
+          <a:fillRef idx="1">
+            <a:schemeClr val="accent1"/>
+          </a:fillRef>
+          <a:effectRef idx="0">
+            <a:schemeClr val="accent1"/>
+          </a:effectRef>
+          <a:fontRef idx="minor">
+            <a:schemeClr val="lt1"/>
+          </a:fontRef>
+        </p:style>
+        <p:txBody>
+          <a:bodyPr rtlCol="0" anchor="ctr"/>
+          <a:lstStyle/>
+          <a:p>
+            <a:pPr algn="ctr"/>
+            <a:endParaRPr lang="en-US" sz="960">
+              <a:latin typeface="Helvetica" pitchFamily="2" charset="0"/>
+            </a:endParaRPr>
+          </a:p>
+        </p:txBody>
+      </p:sp>
+      <p:sp>
+        <p:nvSpPr>
+          <p:cNvPr id="8" name="Rectangle 7">
+            <a:extLst>
+              <a:ext uri="{FF2B5EF4-FFF2-40B4-BE49-F238E27FC236}">
+                <a16:creationId xmlns:a16="http://schemas.microsoft.com/office/drawing/2014/main" id="{36608023-9BD4-97D1-E918-6DC645405023}"/>
+              </a:ext>
+            </a:extLst>
+          </p:cNvPr>
+          <p:cNvSpPr/>
+          <p:nvPr/>
+        </p:nvSpPr>
+        <p:spPr>
+          <a:xfrm>
+            <a:off x="2004625" y="243856"/>
+            <a:ext cx="2032282" cy="2080244"/>
+          </a:xfrm>
+          <a:prstGeom prst="rect">
+            <a:avLst/>
+          </a:prstGeom>
+          <a:solidFill>
+            <a:schemeClr val="bg1"/>
+          </a:solidFill>
+          <a:ln>
+            <a:solidFill>
+              <a:schemeClr val="bg1"/>
+            </a:solidFill>
+          </a:ln>
+        </p:spPr>
+        <p:style>
+          <a:lnRef idx="2">
+            <a:schemeClr val="accent1">
+              <a:shade val="15000"/>
+            </a:schemeClr>
+          </a:lnRef>
+          <a:fillRef idx="1">
+            <a:schemeClr val="accent1"/>
+          </a:fillRef>
+          <a:effectRef idx="0">
+            <a:schemeClr val="accent1"/>
+          </a:effectRef>
+          <a:fontRef idx="minor">
+            <a:schemeClr val="lt1"/>
+          </a:fontRef>
+        </p:style>
+        <p:txBody>
+          <a:bodyPr rtlCol="0" anchor="ctr"/>
+          <a:lstStyle/>
+          <a:p>
+            <a:pPr algn="ctr"/>
+            <a:endParaRPr lang="en-US" sz="960">
+              <a:latin typeface="Helvetica" pitchFamily="2" charset="0"/>
+            </a:endParaRPr>
+          </a:p>
+        </p:txBody>
+      </p:sp>
+      <p:sp>
+        <p:nvSpPr>
+          <p:cNvPr id="10" name="TextBox 9">
+            <a:extLst>
+              <a:ext uri="{FF2B5EF4-FFF2-40B4-BE49-F238E27FC236}">
+                <a16:creationId xmlns:a16="http://schemas.microsoft.com/office/drawing/2014/main" id="{580A0990-775E-0FE1-875F-9F1F0BF4981A}"/>
+              </a:ext>
+            </a:extLst>
+          </p:cNvPr>
+          <p:cNvSpPr txBox="1"/>
+          <p:nvPr/>
+        </p:nvSpPr>
+        <p:spPr>
+          <a:xfrm rot="16200000">
+            <a:off x="1192780" y="976566"/>
+            <a:ext cx="1312255" cy="420756"/>
+          </a:xfrm>
+          <a:prstGeom prst="rect">
+            <a:avLst/>
+          </a:prstGeom>
+          <a:noFill/>
+        </p:spPr>
+        <p:txBody>
+          <a:bodyPr wrap="square">
+            <a:spAutoFit/>
+          </a:bodyPr>
+          <a:lstStyle/>
+          <a:p>
+            <a:pPr algn="ctr"/>
+            <a:r>
+              <a:rPr lang="en-US" sz="1067" b="1" dirty="0">
+                <a:latin typeface="Helvetica" pitchFamily="2" charset="0"/>
+                <a:ea typeface="Times New Roman" panose="02020603050405020304" pitchFamily="18" charset="0"/>
+                <a:cs typeface="Arial" panose="020B0604020202020204" pitchFamily="34" charset="0"/>
+              </a:rPr>
+              <a:t>Covariates</a:t>
+            </a:r>
+          </a:p>
+          <a:p>
+            <a:pPr algn="ctr"/>
+            <a:endParaRPr lang="en-US" sz="1067" b="1" dirty="0">
+              <a:latin typeface="Helvetica" pitchFamily="2" charset="0"/>
+            </a:endParaRPr>
+          </a:p>
+        </p:txBody>
+      </p:sp>
+      <p:sp>
+        <p:nvSpPr>
+          <p:cNvPr id="4" name="TextBox 3">
+            <a:extLst>
+              <a:ext uri="{FF2B5EF4-FFF2-40B4-BE49-F238E27FC236}">
+                <a16:creationId xmlns:a16="http://schemas.microsoft.com/office/drawing/2014/main" id="{04407815-177D-7174-8DFA-83573D912F05}"/>
+              </a:ext>
+            </a:extLst>
+          </p:cNvPr>
+          <p:cNvSpPr txBox="1"/>
+          <p:nvPr/>
+        </p:nvSpPr>
+        <p:spPr>
+          <a:xfrm rot="18877744">
+            <a:off x="2940407" y="2643682"/>
+            <a:ext cx="1684881" cy="584968"/>
+          </a:xfrm>
+          <a:prstGeom prst="rect">
+            <a:avLst/>
+          </a:prstGeom>
+          <a:noFill/>
+        </p:spPr>
+        <p:txBody>
+          <a:bodyPr wrap="square">
+            <a:spAutoFit/>
+          </a:bodyPr>
+          <a:lstStyle/>
+          <a:p>
+            <a:pPr algn="ctr"/>
+            <a:r>
+              <a:rPr lang="en-US" sz="1067" dirty="0">
+                <a:latin typeface="Helvetica" pitchFamily="2" charset="0"/>
+                <a:ea typeface="Times New Roman" panose="02020603050405020304" pitchFamily="18" charset="0"/>
+                <a:cs typeface="Arial" panose="020B0604020202020204" pitchFamily="34" charset="0"/>
+              </a:rPr>
+              <a:t>Response or no response</a:t>
+            </a:r>
+          </a:p>
+          <a:p>
+            <a:pPr algn="ctr"/>
+            <a:endParaRPr lang="en-US" sz="1067" dirty="0">
+              <a:latin typeface="Helvetica" pitchFamily="2" charset="0"/>
+            </a:endParaRPr>
+          </a:p>
+        </p:txBody>
+      </p:sp>
+      <p:sp>
+        <p:nvSpPr>
+          <p:cNvPr id="6" name="TextBox 5">
+            <a:extLst>
+              <a:ext uri="{FF2B5EF4-FFF2-40B4-BE49-F238E27FC236}">
+                <a16:creationId xmlns:a16="http://schemas.microsoft.com/office/drawing/2014/main" id="{721D3A21-1D09-3258-B2A8-AE7EE96695E3}"/>
+              </a:ext>
+            </a:extLst>
+          </p:cNvPr>
+          <p:cNvSpPr txBox="1"/>
+          <p:nvPr/>
+        </p:nvSpPr>
+        <p:spPr>
+          <a:xfrm rot="18877744">
+            <a:off x="3806493" y="2497142"/>
+            <a:ext cx="1169022" cy="420756"/>
+          </a:xfrm>
+          <a:prstGeom prst="rect">
+            <a:avLst/>
+          </a:prstGeom>
+          <a:noFill/>
+        </p:spPr>
+        <p:txBody>
+          <a:bodyPr wrap="square">
+            <a:spAutoFit/>
+          </a:bodyPr>
+          <a:lstStyle/>
+          <a:p>
+            <a:pPr algn="ctr"/>
+            <a:r>
+              <a:rPr lang="en-US" sz="1067" dirty="0">
+                <a:latin typeface="Helvetica" pitchFamily="2" charset="0"/>
+                <a:ea typeface="Times New Roman" panose="02020603050405020304" pitchFamily="18" charset="0"/>
+                <a:cs typeface="Arial" panose="020B0604020202020204" pitchFamily="34" charset="0"/>
+              </a:rPr>
+              <a:t>Time of peak</a:t>
+            </a:r>
+          </a:p>
+          <a:p>
+            <a:pPr algn="ctr"/>
+            <a:endParaRPr lang="en-US" sz="1067" dirty="0">
+              <a:latin typeface="Helvetica" pitchFamily="2" charset="0"/>
+            </a:endParaRPr>
+          </a:p>
+        </p:txBody>
+      </p:sp>
+      <p:sp>
+        <p:nvSpPr>
+          <p:cNvPr id="11" name="TextBox 10">
+            <a:extLst>
+              <a:ext uri="{FF2B5EF4-FFF2-40B4-BE49-F238E27FC236}">
+                <a16:creationId xmlns:a16="http://schemas.microsoft.com/office/drawing/2014/main" id="{ADC630D5-A470-C93F-4F97-0CA49897F6C6}"/>
+              </a:ext>
+            </a:extLst>
+          </p:cNvPr>
+          <p:cNvSpPr txBox="1"/>
+          <p:nvPr/>
+        </p:nvSpPr>
+        <p:spPr>
+          <a:xfrm rot="18877744">
+            <a:off x="3926114" y="2621665"/>
+            <a:ext cx="1440825" cy="420756"/>
+          </a:xfrm>
+          <a:prstGeom prst="rect">
+            <a:avLst/>
+          </a:prstGeom>
+          <a:noFill/>
+        </p:spPr>
+        <p:txBody>
+          <a:bodyPr wrap="square">
+            <a:spAutoFit/>
+          </a:bodyPr>
+          <a:lstStyle/>
+          <a:p>
+            <a:pPr algn="ctr"/>
+            <a:r>
+              <a:rPr lang="en-US" sz="1067" dirty="0">
+                <a:latin typeface="Helvetica" pitchFamily="2" charset="0"/>
+                <a:ea typeface="Times New Roman" panose="02020603050405020304" pitchFamily="18" charset="0"/>
+                <a:cs typeface="Arial" panose="020B0604020202020204" pitchFamily="34" charset="0"/>
+              </a:rPr>
+              <a:t>Magnitude of peak</a:t>
+            </a:r>
+          </a:p>
+          <a:p>
+            <a:pPr algn="ctr"/>
+            <a:endParaRPr lang="en-US" sz="1067" dirty="0">
+              <a:latin typeface="Helvetica" pitchFamily="2" charset="0"/>
+            </a:endParaRPr>
+          </a:p>
+        </p:txBody>
+      </p:sp>
+      <p:sp>
+        <p:nvSpPr>
+          <p:cNvPr id="12" name="TextBox 11">
+            <a:extLst>
+              <a:ext uri="{FF2B5EF4-FFF2-40B4-BE49-F238E27FC236}">
+                <a16:creationId xmlns:a16="http://schemas.microsoft.com/office/drawing/2014/main" id="{1989D843-2016-27E2-F80D-8911D9E73DF6}"/>
+              </a:ext>
+            </a:extLst>
+          </p:cNvPr>
+          <p:cNvSpPr txBox="1"/>
+          <p:nvPr/>
+        </p:nvSpPr>
+        <p:spPr>
+          <a:xfrm rot="18877744">
+            <a:off x="4383843" y="2489212"/>
+            <a:ext cx="1440825" cy="584968"/>
+          </a:xfrm>
+          <a:prstGeom prst="rect">
+            <a:avLst/>
+          </a:prstGeom>
+          <a:noFill/>
+        </p:spPr>
+        <p:txBody>
+          <a:bodyPr wrap="square">
+            <a:spAutoFit/>
+          </a:bodyPr>
+          <a:lstStyle/>
+          <a:p>
+            <a:pPr algn="ctr"/>
+            <a:r>
+              <a:rPr lang="en-US" sz="1067" dirty="0">
+                <a:latin typeface="Helvetica" pitchFamily="2" charset="0"/>
+                <a:ea typeface="Times New Roman" panose="02020603050405020304" pitchFamily="18" charset="0"/>
+                <a:cs typeface="Arial" panose="020B0604020202020204" pitchFamily="34" charset="0"/>
+              </a:rPr>
+              <a:t>Speed (linear response slope)</a:t>
+            </a:r>
+          </a:p>
+          <a:p>
+            <a:pPr algn="ctr"/>
+            <a:endParaRPr lang="en-US" sz="1067" dirty="0">
+              <a:latin typeface="Helvetica" pitchFamily="2" charset="0"/>
+            </a:endParaRPr>
+          </a:p>
+        </p:txBody>
+      </p:sp>
+      <p:sp>
+        <p:nvSpPr>
+          <p:cNvPr id="13" name="TextBox 12">
+            <a:extLst>
+              <a:ext uri="{FF2B5EF4-FFF2-40B4-BE49-F238E27FC236}">
+                <a16:creationId xmlns:a16="http://schemas.microsoft.com/office/drawing/2014/main" id="{DEE40C53-F70B-939D-90E3-BB424099A5FC}"/>
+              </a:ext>
+            </a:extLst>
+          </p:cNvPr>
+          <p:cNvSpPr txBox="1"/>
+          <p:nvPr/>
+        </p:nvSpPr>
+        <p:spPr>
+          <a:xfrm>
+            <a:off x="3690720" y="3442576"/>
+            <a:ext cx="1695250" cy="420756"/>
+          </a:xfrm>
+          <a:prstGeom prst="rect">
+            <a:avLst/>
+          </a:prstGeom>
+          <a:noFill/>
+        </p:spPr>
+        <p:txBody>
+          <a:bodyPr wrap="square">
+            <a:spAutoFit/>
+          </a:bodyPr>
+          <a:lstStyle/>
+          <a:p>
+            <a:pPr algn="ctr"/>
+            <a:r>
+              <a:rPr lang="en-US" sz="1067" b="1" dirty="0">
+                <a:latin typeface="Helvetica" pitchFamily="2" charset="0"/>
+                <a:ea typeface="Times New Roman" panose="02020603050405020304" pitchFamily="18" charset="0"/>
+                <a:cs typeface="Arial" panose="020B0604020202020204" pitchFamily="34" charset="0"/>
+              </a:rPr>
+              <a:t>Response Variables</a:t>
+            </a:r>
+          </a:p>
+          <a:p>
+            <a:pPr algn="ctr"/>
+            <a:endParaRPr lang="en-US" sz="1067" dirty="0">
+              <a:latin typeface="Helvetica" pitchFamily="2" charset="0"/>
+            </a:endParaRPr>
+          </a:p>
+        </p:txBody>
+      </p:sp>
+      <p:sp>
+        <p:nvSpPr>
+          <p:cNvPr id="18" name="TextBox 17">
+            <a:extLst>
+              <a:ext uri="{FF2B5EF4-FFF2-40B4-BE49-F238E27FC236}">
+                <a16:creationId xmlns:a16="http://schemas.microsoft.com/office/drawing/2014/main" id="{D0682603-84BB-F3C3-9DC0-20A9D364F51D}"/>
+              </a:ext>
+            </a:extLst>
+          </p:cNvPr>
+          <p:cNvSpPr txBox="1"/>
+          <p:nvPr/>
+        </p:nvSpPr>
+        <p:spPr>
+          <a:xfrm>
+            <a:off x="2969492" y="243856"/>
+            <a:ext cx="1312255" cy="420756"/>
+          </a:xfrm>
+          <a:prstGeom prst="rect">
+            <a:avLst/>
+          </a:prstGeom>
+          <a:noFill/>
+        </p:spPr>
+        <p:txBody>
+          <a:bodyPr wrap="square">
+            <a:spAutoFit/>
+          </a:bodyPr>
+          <a:lstStyle/>
+          <a:p>
+            <a:pPr algn="ctr"/>
+            <a:r>
+              <a:rPr lang="en-US" sz="1067" dirty="0">
+                <a:latin typeface="Helvetica" pitchFamily="2" charset="0"/>
+                <a:ea typeface="Times New Roman" panose="02020603050405020304" pitchFamily="18" charset="0"/>
+                <a:cs typeface="Arial" panose="020B0604020202020204" pitchFamily="34" charset="0"/>
+              </a:rPr>
+              <a:t>Plot/footprint</a:t>
+            </a:r>
+          </a:p>
+          <a:p>
+            <a:pPr algn="ctr"/>
+            <a:endParaRPr lang="en-US" sz="1067" dirty="0">
+              <a:latin typeface="Helvetica" pitchFamily="2" charset="0"/>
+            </a:endParaRPr>
+          </a:p>
+        </p:txBody>
+      </p:sp>
+      <p:sp>
+        <p:nvSpPr>
+          <p:cNvPr id="19" name="TextBox 18">
+            <a:extLst>
+              <a:ext uri="{FF2B5EF4-FFF2-40B4-BE49-F238E27FC236}">
+                <a16:creationId xmlns:a16="http://schemas.microsoft.com/office/drawing/2014/main" id="{B28E41B6-2F16-31DF-3F2D-763DB7249F6E}"/>
+              </a:ext>
+            </a:extLst>
+          </p:cNvPr>
+          <p:cNvSpPr txBox="1"/>
+          <p:nvPr/>
+        </p:nvSpPr>
+        <p:spPr>
+          <a:xfrm>
+            <a:off x="2881382" y="449905"/>
+            <a:ext cx="1312255" cy="420756"/>
+          </a:xfrm>
+          <a:prstGeom prst="rect">
+            <a:avLst/>
+          </a:prstGeom>
+          <a:noFill/>
+        </p:spPr>
+        <p:txBody>
+          <a:bodyPr wrap="square">
+            <a:spAutoFit/>
+          </a:bodyPr>
+          <a:lstStyle/>
+          <a:p>
+            <a:pPr algn="ctr"/>
+            <a:r>
+              <a:rPr lang="en-US" sz="1067" dirty="0">
+                <a:latin typeface="Helvetica" pitchFamily="2" charset="0"/>
+                <a:ea typeface="Times New Roman" panose="02020603050405020304" pitchFamily="18" charset="0"/>
+                <a:cs typeface="Arial" panose="020B0604020202020204" pitchFamily="34" charset="0"/>
+              </a:rPr>
+              <a:t>Individual</a:t>
+            </a:r>
+          </a:p>
+          <a:p>
+            <a:pPr algn="ctr"/>
+            <a:endParaRPr lang="en-US" sz="1067" dirty="0">
+              <a:latin typeface="Helvetica" pitchFamily="2" charset="0"/>
+            </a:endParaRPr>
+          </a:p>
+        </p:txBody>
+      </p:sp>
+      <p:sp>
+        <p:nvSpPr>
+          <p:cNvPr id="20" name="TextBox 19">
+            <a:extLst>
+              <a:ext uri="{FF2B5EF4-FFF2-40B4-BE49-F238E27FC236}">
+                <a16:creationId xmlns:a16="http://schemas.microsoft.com/office/drawing/2014/main" id="{616D3AD4-E8B0-D235-EA3A-1036DE5F8229}"/>
+              </a:ext>
+            </a:extLst>
+          </p:cNvPr>
+          <p:cNvSpPr txBox="1"/>
+          <p:nvPr/>
+        </p:nvSpPr>
+        <p:spPr>
+          <a:xfrm>
+            <a:off x="2881382" y="654303"/>
+            <a:ext cx="1312255" cy="420756"/>
+          </a:xfrm>
+          <a:prstGeom prst="rect">
+            <a:avLst/>
+          </a:prstGeom>
+          <a:noFill/>
+        </p:spPr>
+        <p:txBody>
+          <a:bodyPr wrap="square">
+            <a:spAutoFit/>
+          </a:bodyPr>
+          <a:lstStyle/>
+          <a:p>
+            <a:pPr algn="ctr"/>
+            <a:r>
+              <a:rPr lang="en-US" sz="1067" dirty="0">
+                <a:latin typeface="Helvetica" pitchFamily="2" charset="0"/>
+                <a:ea typeface="Times New Roman" panose="02020603050405020304" pitchFamily="18" charset="0"/>
+                <a:cs typeface="Arial" panose="020B0604020202020204" pitchFamily="34" charset="0"/>
+              </a:rPr>
+              <a:t>Leaf</a:t>
+            </a:r>
+          </a:p>
+          <a:p>
+            <a:pPr algn="ctr"/>
+            <a:endParaRPr lang="en-US" sz="1067" dirty="0">
+              <a:latin typeface="Helvetica" pitchFamily="2" charset="0"/>
+            </a:endParaRPr>
+          </a:p>
+        </p:txBody>
+      </p:sp>
+      <p:sp>
+        <p:nvSpPr>
+          <p:cNvPr id="22" name="TextBox 21">
+            <a:extLst>
+              <a:ext uri="{FF2B5EF4-FFF2-40B4-BE49-F238E27FC236}">
+                <a16:creationId xmlns:a16="http://schemas.microsoft.com/office/drawing/2014/main" id="{9E48BCBF-E893-C73B-3BF3-0E0DE83DFE08}"/>
+              </a:ext>
+            </a:extLst>
+          </p:cNvPr>
+          <p:cNvSpPr txBox="1"/>
+          <p:nvPr/>
+        </p:nvSpPr>
+        <p:spPr>
+          <a:xfrm>
+            <a:off x="2888233" y="833485"/>
+            <a:ext cx="1312255" cy="420756"/>
+          </a:xfrm>
+          <a:prstGeom prst="rect">
+            <a:avLst/>
+          </a:prstGeom>
+          <a:noFill/>
+        </p:spPr>
+        <p:txBody>
+          <a:bodyPr wrap="square">
+            <a:spAutoFit/>
+          </a:bodyPr>
+          <a:lstStyle/>
+          <a:p>
+            <a:pPr algn="ctr"/>
+            <a:r>
+              <a:rPr lang="en-US" sz="1067" dirty="0">
+                <a:latin typeface="Helvetica" pitchFamily="2" charset="0"/>
+                <a:ea typeface="Times New Roman" panose="02020603050405020304" pitchFamily="18" charset="0"/>
+                <a:cs typeface="Arial" panose="020B0604020202020204" pitchFamily="34" charset="0"/>
+              </a:rPr>
+              <a:t>MAP</a:t>
+            </a:r>
+          </a:p>
+          <a:p>
+            <a:pPr algn="ctr"/>
+            <a:endParaRPr lang="en-US" sz="1067" dirty="0">
+              <a:latin typeface="Helvetica" pitchFamily="2" charset="0"/>
+            </a:endParaRPr>
+          </a:p>
+        </p:txBody>
+      </p:sp>
+      <p:sp>
+        <p:nvSpPr>
+          <p:cNvPr id="23" name="TextBox 22">
+            <a:extLst>
+              <a:ext uri="{FF2B5EF4-FFF2-40B4-BE49-F238E27FC236}">
+                <a16:creationId xmlns:a16="http://schemas.microsoft.com/office/drawing/2014/main" id="{745A0243-9210-E2A2-E7F7-01ED646EE183}"/>
+              </a:ext>
+            </a:extLst>
+          </p:cNvPr>
+          <p:cNvSpPr txBox="1"/>
+          <p:nvPr/>
+        </p:nvSpPr>
+        <p:spPr>
+          <a:xfrm>
+            <a:off x="2883902" y="998174"/>
+            <a:ext cx="1312255" cy="420756"/>
+          </a:xfrm>
+          <a:prstGeom prst="rect">
+            <a:avLst/>
+          </a:prstGeom>
+          <a:noFill/>
+        </p:spPr>
+        <p:txBody>
+          <a:bodyPr wrap="square">
+            <a:spAutoFit/>
+          </a:bodyPr>
+          <a:lstStyle/>
+          <a:p>
+            <a:pPr algn="ctr"/>
+            <a:r>
+              <a:rPr lang="en-US" sz="1067" dirty="0">
+                <a:latin typeface="Helvetica" pitchFamily="2" charset="0"/>
+                <a:ea typeface="Times New Roman" panose="02020603050405020304" pitchFamily="18" charset="0"/>
+                <a:cs typeface="Arial" panose="020B0604020202020204" pitchFamily="34" charset="0"/>
+              </a:rPr>
+              <a:t>MAT</a:t>
+            </a:r>
+          </a:p>
+          <a:p>
+            <a:pPr algn="ctr"/>
+            <a:endParaRPr lang="en-US" sz="1067" dirty="0">
+              <a:latin typeface="Helvetica" pitchFamily="2" charset="0"/>
+            </a:endParaRPr>
+          </a:p>
+        </p:txBody>
+      </p:sp>
+      <p:sp>
+        <p:nvSpPr>
+          <p:cNvPr id="26" name="TextBox 25">
+            <a:extLst>
+              <a:ext uri="{FF2B5EF4-FFF2-40B4-BE49-F238E27FC236}">
+                <a16:creationId xmlns:a16="http://schemas.microsoft.com/office/drawing/2014/main" id="{62A6AE5E-190F-8C9A-845C-D923860E19B2}"/>
+              </a:ext>
+            </a:extLst>
+          </p:cNvPr>
+          <p:cNvSpPr txBox="1"/>
+          <p:nvPr/>
+        </p:nvSpPr>
+        <p:spPr>
+          <a:xfrm>
+            <a:off x="2879572" y="1169209"/>
+            <a:ext cx="1312255" cy="420756"/>
+          </a:xfrm>
+          <a:prstGeom prst="rect">
+            <a:avLst/>
+          </a:prstGeom>
+          <a:noFill/>
+        </p:spPr>
+        <p:txBody>
+          <a:bodyPr wrap="square">
+            <a:spAutoFit/>
+          </a:bodyPr>
+          <a:lstStyle/>
+          <a:p>
+            <a:pPr algn="ctr"/>
+            <a:r>
+              <a:rPr lang="en-US" sz="1067" dirty="0">
+                <a:latin typeface="Helvetica" pitchFamily="2" charset="0"/>
+                <a:ea typeface="Times New Roman" panose="02020603050405020304" pitchFamily="18" charset="0"/>
+                <a:cs typeface="Arial" panose="020B0604020202020204" pitchFamily="34" charset="0"/>
+              </a:rPr>
+              <a:t>Pulse amount</a:t>
+            </a:r>
+          </a:p>
+          <a:p>
+            <a:pPr algn="ctr"/>
+            <a:endParaRPr lang="en-US" sz="1067" dirty="0">
+              <a:latin typeface="Helvetica" pitchFamily="2" charset="0"/>
+            </a:endParaRPr>
+          </a:p>
+        </p:txBody>
+      </p:sp>
+      <p:sp>
+        <p:nvSpPr>
+          <p:cNvPr id="27" name="TextBox 26">
+            <a:extLst>
+              <a:ext uri="{FF2B5EF4-FFF2-40B4-BE49-F238E27FC236}">
+                <a16:creationId xmlns:a16="http://schemas.microsoft.com/office/drawing/2014/main" id="{2B0AF598-A4A1-3894-E7D7-6660F1153D79}"/>
+              </a:ext>
+            </a:extLst>
+          </p:cNvPr>
+          <p:cNvSpPr txBox="1"/>
+          <p:nvPr/>
+        </p:nvSpPr>
+        <p:spPr>
+          <a:xfrm>
+            <a:off x="2895364" y="1331112"/>
+            <a:ext cx="1312255" cy="420756"/>
+          </a:xfrm>
+          <a:prstGeom prst="rect">
+            <a:avLst/>
+          </a:prstGeom>
+          <a:noFill/>
+        </p:spPr>
+        <p:txBody>
+          <a:bodyPr wrap="square">
+            <a:spAutoFit/>
+          </a:bodyPr>
+          <a:lstStyle/>
+          <a:p>
+            <a:pPr algn="ctr"/>
+            <a:r>
+              <a:rPr lang="en-US" sz="1067" dirty="0">
+                <a:latin typeface="Helvetica" pitchFamily="2" charset="0"/>
+                <a:ea typeface="Times New Roman" panose="02020603050405020304" pitchFamily="18" charset="0"/>
+                <a:cs typeface="Arial" panose="020B0604020202020204" pitchFamily="34" charset="0"/>
+              </a:rPr>
+              <a:t>Water-related</a:t>
+            </a:r>
+          </a:p>
+          <a:p>
+            <a:pPr algn="ctr"/>
+            <a:endParaRPr lang="en-US" sz="1067" dirty="0">
+              <a:latin typeface="Helvetica" pitchFamily="2" charset="0"/>
+            </a:endParaRPr>
+          </a:p>
+        </p:txBody>
+      </p:sp>
+      <p:sp>
+        <p:nvSpPr>
+          <p:cNvPr id="28" name="TextBox 27">
+            <a:extLst>
+              <a:ext uri="{FF2B5EF4-FFF2-40B4-BE49-F238E27FC236}">
+                <a16:creationId xmlns:a16="http://schemas.microsoft.com/office/drawing/2014/main" id="{B754BA05-F4A1-E751-93C2-1820392BD032}"/>
+              </a:ext>
+            </a:extLst>
+          </p:cNvPr>
+          <p:cNvSpPr txBox="1"/>
+          <p:nvPr/>
+        </p:nvSpPr>
+        <p:spPr>
+          <a:xfrm>
+            <a:off x="2895364" y="1513209"/>
+            <a:ext cx="1312255" cy="420756"/>
+          </a:xfrm>
+          <a:prstGeom prst="rect">
+            <a:avLst/>
+          </a:prstGeom>
+          <a:noFill/>
+        </p:spPr>
+        <p:txBody>
+          <a:bodyPr wrap="square">
+            <a:spAutoFit/>
+          </a:bodyPr>
+          <a:lstStyle/>
+          <a:p>
+            <a:pPr algn="ctr"/>
+            <a:r>
+              <a:rPr lang="en-US" sz="1067" dirty="0">
+                <a:latin typeface="Helvetica" pitchFamily="2" charset="0"/>
+                <a:ea typeface="Times New Roman" panose="02020603050405020304" pitchFamily="18" charset="0"/>
+                <a:cs typeface="Arial" panose="020B0604020202020204" pitchFamily="34" charset="0"/>
+              </a:rPr>
+              <a:t>Carbon-related</a:t>
+            </a:r>
+          </a:p>
+          <a:p>
+            <a:pPr algn="ctr"/>
+            <a:endParaRPr lang="en-US" sz="1067" dirty="0">
+              <a:latin typeface="Helvetica" pitchFamily="2" charset="0"/>
+            </a:endParaRPr>
+          </a:p>
+        </p:txBody>
+      </p:sp>
+      <p:sp>
+        <p:nvSpPr>
+          <p:cNvPr id="2" name="TextBox 1">
+            <a:extLst>
+              <a:ext uri="{FF2B5EF4-FFF2-40B4-BE49-F238E27FC236}">
+                <a16:creationId xmlns:a16="http://schemas.microsoft.com/office/drawing/2014/main" id="{5AD75E95-009D-56C5-F43A-F73D30858929}"/>
+              </a:ext>
+            </a:extLst>
+          </p:cNvPr>
+          <p:cNvSpPr txBox="1"/>
+          <p:nvPr/>
+        </p:nvSpPr>
+        <p:spPr>
+          <a:xfrm>
+            <a:off x="1894511" y="1735553"/>
+            <a:ext cx="2297316" cy="387798"/>
+          </a:xfrm>
+          <a:prstGeom prst="rect">
+            <a:avLst/>
+          </a:prstGeom>
+          <a:noFill/>
+        </p:spPr>
+        <p:txBody>
+          <a:bodyPr wrap="square">
+            <a:spAutoFit/>
+          </a:bodyPr>
+          <a:lstStyle/>
+          <a:p>
+            <a:pPr algn="ctr"/>
+            <a:r>
+              <a:rPr lang="en-US" sz="853" dirty="0">
+                <a:latin typeface="Helvetica" pitchFamily="2" charset="0"/>
+                <a:ea typeface="Times New Roman" panose="02020603050405020304" pitchFamily="18" charset="0"/>
+                <a:cs typeface="Arial" panose="020B0604020202020204" pitchFamily="34" charset="0"/>
+              </a:rPr>
+              <a:t>Pulse amount × water- or carbon- related</a:t>
+            </a:r>
+          </a:p>
+          <a:p>
+            <a:pPr algn="ctr"/>
+            <a:endParaRPr lang="en-US" sz="1067" dirty="0">
+              <a:latin typeface="Helvetica" pitchFamily="2" charset="0"/>
+            </a:endParaRPr>
+          </a:p>
+        </p:txBody>
+      </p:sp>
+      <p:sp>
+        <p:nvSpPr>
+          <p:cNvPr id="9" name="TextBox 8">
+            <a:extLst>
+              <a:ext uri="{FF2B5EF4-FFF2-40B4-BE49-F238E27FC236}">
+                <a16:creationId xmlns:a16="http://schemas.microsoft.com/office/drawing/2014/main" id="{20255CE8-E1DC-645D-A330-73162A645D4D}"/>
+              </a:ext>
+            </a:extLst>
+          </p:cNvPr>
+          <p:cNvSpPr txBox="1"/>
+          <p:nvPr/>
+        </p:nvSpPr>
+        <p:spPr>
+          <a:xfrm>
+            <a:off x="2078759" y="1907908"/>
+            <a:ext cx="2297316" cy="387798"/>
+          </a:xfrm>
+          <a:prstGeom prst="rect">
+            <a:avLst/>
+          </a:prstGeom>
+          <a:noFill/>
+        </p:spPr>
+        <p:txBody>
+          <a:bodyPr wrap="square">
+            <a:spAutoFit/>
+          </a:bodyPr>
+          <a:lstStyle/>
+          <a:p>
+            <a:pPr algn="ctr"/>
+            <a:r>
+              <a:rPr lang="en-US" sz="853" dirty="0">
+                <a:latin typeface="Helvetica" pitchFamily="2" charset="0"/>
+                <a:ea typeface="Times New Roman" panose="02020603050405020304" pitchFamily="18" charset="0"/>
+                <a:cs typeface="Arial" panose="020B0604020202020204" pitchFamily="34" charset="0"/>
+              </a:rPr>
+              <a:t>MAP × water- or carbon- related</a:t>
+            </a:r>
+          </a:p>
+          <a:p>
+            <a:pPr algn="ctr"/>
+            <a:endParaRPr lang="en-US" sz="1067" dirty="0">
+              <a:latin typeface="Helvetica" pitchFamily="2" charset="0"/>
+            </a:endParaRPr>
+          </a:p>
+        </p:txBody>
+      </p:sp>
+      <p:sp>
+        <p:nvSpPr>
+          <p:cNvPr id="14" name="TextBox 13">
+            <a:extLst>
+              <a:ext uri="{FF2B5EF4-FFF2-40B4-BE49-F238E27FC236}">
+                <a16:creationId xmlns:a16="http://schemas.microsoft.com/office/drawing/2014/main" id="{5AA41467-43B1-8929-BA59-7BAE5659D3A2}"/>
+              </a:ext>
+            </a:extLst>
+          </p:cNvPr>
+          <p:cNvSpPr txBox="1"/>
+          <p:nvPr/>
+        </p:nvSpPr>
+        <p:spPr>
+          <a:xfrm>
+            <a:off x="2537253" y="2106382"/>
+            <a:ext cx="2297316" cy="387798"/>
+          </a:xfrm>
+          <a:prstGeom prst="rect">
+            <a:avLst/>
+          </a:prstGeom>
+          <a:noFill/>
+        </p:spPr>
+        <p:txBody>
+          <a:bodyPr wrap="square">
+            <a:spAutoFit/>
+          </a:bodyPr>
+          <a:lstStyle/>
+          <a:p>
+            <a:pPr algn="ctr"/>
+            <a:r>
+              <a:rPr lang="en-US" sz="853" dirty="0">
+                <a:latin typeface="Helvetica" pitchFamily="2" charset="0"/>
+                <a:ea typeface="Times New Roman" panose="02020603050405020304" pitchFamily="18" charset="0"/>
+                <a:cs typeface="Arial" panose="020B0604020202020204" pitchFamily="34" charset="0"/>
+              </a:rPr>
+              <a:t>MAP × MAT</a:t>
+            </a:r>
+          </a:p>
+          <a:p>
+            <a:pPr algn="ctr"/>
+            <a:endParaRPr lang="en-US" sz="1067" dirty="0">
+              <a:latin typeface="Helvetica" pitchFamily="2" charset="0"/>
+            </a:endParaRPr>
+          </a:p>
+        </p:txBody>
+      </p:sp>
+      <p:pic>
+        <p:nvPicPr>
+          <p:cNvPr id="15" name="Picture 14" descr="A screenshot of a computer&#10;&#10;Description automatically generated">
+            <a:extLst>
+              <a:ext uri="{FF2B5EF4-FFF2-40B4-BE49-F238E27FC236}">
+                <a16:creationId xmlns:a16="http://schemas.microsoft.com/office/drawing/2014/main" id="{ED286B2B-4F8B-0C31-4C7F-F95F57F558B8}"/>
+              </a:ext>
+            </a:extLst>
+          </p:cNvPr>
+          <p:cNvPicPr>
+            <a:picLocks noChangeAspect="1"/>
+          </p:cNvPicPr>
+          <p:nvPr/>
+        </p:nvPicPr>
+        <p:blipFill>
+          <a:blip r:embed="rId3" cstate="print">
+            <a:extLst>
+              <a:ext uri="{28A0092B-C50C-407E-A947-70E740481C1C}">
+                <a14:useLocalDpi xmlns:a14="http://schemas.microsoft.com/office/drawing/2010/main" val="0"/>
+              </a:ext>
+            </a:extLst>
+          </a:blip>
+          <a:srcRect l="54610" t="370" r="36958" b="93711"/>
+          <a:stretch/>
+        </p:blipFill>
+        <p:spPr>
+          <a:xfrm rot="5400000">
+            <a:off x="1859422" y="2326531"/>
+            <a:ext cx="282843" cy="215813"/>
+          </a:xfrm>
+          <a:prstGeom prst="rect">
+            <a:avLst/>
+          </a:prstGeom>
+        </p:spPr>
+      </p:pic>
+      <p:pic>
+        <p:nvPicPr>
+          <p:cNvPr id="16" name="Picture 15" descr="A screenshot of a computer&#10;&#10;Description automatically generated">
+            <a:extLst>
+              <a:ext uri="{FF2B5EF4-FFF2-40B4-BE49-F238E27FC236}">
+                <a16:creationId xmlns:a16="http://schemas.microsoft.com/office/drawing/2014/main" id="{521B005F-3640-1312-6B89-CA574FD78886}"/>
+              </a:ext>
+            </a:extLst>
+          </p:cNvPr>
+          <p:cNvPicPr>
+            <a:picLocks noChangeAspect="1"/>
+          </p:cNvPicPr>
+          <p:nvPr/>
+        </p:nvPicPr>
+        <p:blipFill>
+          <a:blip r:embed="rId3" cstate="print">
+            <a:extLst>
+              <a:ext uri="{28A0092B-C50C-407E-A947-70E740481C1C}">
+                <a14:useLocalDpi xmlns:a14="http://schemas.microsoft.com/office/drawing/2010/main" val="0"/>
+              </a:ext>
+            </a:extLst>
+          </a:blip>
+          <a:srcRect l="88907" t="378" r="7900" b="94193"/>
+          <a:stretch/>
+        </p:blipFill>
+        <p:spPr>
+          <a:xfrm rot="5400000">
+            <a:off x="1947286" y="2816502"/>
+            <a:ext cx="107113" cy="197929"/>
+          </a:xfrm>
+          <a:prstGeom prst="rect">
+            <a:avLst/>
+          </a:prstGeom>
+        </p:spPr>
+      </p:pic>
+      <p:pic>
+        <p:nvPicPr>
+          <p:cNvPr id="17" name="Picture 16" descr="A screenshot of a computer&#10;&#10;Description automatically generated">
+            <a:extLst>
+              <a:ext uri="{FF2B5EF4-FFF2-40B4-BE49-F238E27FC236}">
+                <a16:creationId xmlns:a16="http://schemas.microsoft.com/office/drawing/2014/main" id="{6DF0BE57-1A68-BD01-6A0D-68EB46AACD1C}"/>
+              </a:ext>
+            </a:extLst>
+          </p:cNvPr>
+          <p:cNvPicPr>
+            <a:picLocks noChangeAspect="1"/>
+          </p:cNvPicPr>
+          <p:nvPr/>
+        </p:nvPicPr>
+        <p:blipFill>
+          <a:blip r:embed="rId3" cstate="print">
+            <a:extLst>
+              <a:ext uri="{28A0092B-C50C-407E-A947-70E740481C1C}">
+                <a14:useLocalDpi xmlns:a14="http://schemas.microsoft.com/office/drawing/2010/main" val="0"/>
+              </a:ext>
+            </a:extLst>
+          </a:blip>
+          <a:srcRect l="71169" t="1761" r="24557" b="95458"/>
+          <a:stretch/>
+        </p:blipFill>
+        <p:spPr>
+          <a:xfrm rot="5400000">
+            <a:off x="1929159" y="2653388"/>
+            <a:ext cx="143366" cy="101404"/>
+          </a:xfrm>
+          <a:prstGeom prst="rect">
+            <a:avLst/>
+          </a:prstGeom>
+        </p:spPr>
+      </p:pic>
+      <p:sp>
+        <p:nvSpPr>
+          <p:cNvPr id="21" name="TextBox 20">
+            <a:extLst>
+              <a:ext uri="{FF2B5EF4-FFF2-40B4-BE49-F238E27FC236}">
+                <a16:creationId xmlns:a16="http://schemas.microsoft.com/office/drawing/2014/main" id="{0D1528D7-65EA-5857-B952-7927BBFE931F}"/>
+              </a:ext>
+            </a:extLst>
+          </p:cNvPr>
+          <p:cNvSpPr txBox="1"/>
+          <p:nvPr/>
+        </p:nvSpPr>
+        <p:spPr>
+          <a:xfrm>
+            <a:off x="2004065" y="2846567"/>
+            <a:ext cx="523756" cy="437236"/>
+          </a:xfrm>
+          <a:prstGeom prst="rect">
+            <a:avLst/>
+          </a:prstGeom>
+          <a:noFill/>
+        </p:spPr>
+        <p:txBody>
+          <a:bodyPr wrap="square">
+            <a:spAutoFit/>
+          </a:bodyPr>
+          <a:lstStyle/>
+          <a:p>
+            <a:pPr algn="ctr"/>
+            <a:r>
+              <a:rPr lang="en-US" sz="747" b="1" dirty="0">
+                <a:latin typeface="Helvetica" pitchFamily="2" charset="0"/>
+                <a:ea typeface="Times New Roman" panose="02020603050405020304" pitchFamily="18" charset="0"/>
+                <a:cs typeface="Arial" panose="020B0604020202020204" pitchFamily="34" charset="0"/>
+              </a:rPr>
+              <a:t>Positive</a:t>
+            </a:r>
+          </a:p>
+          <a:p>
+            <a:pPr algn="ctr"/>
+            <a:endParaRPr lang="en-US" sz="747" dirty="0">
+              <a:latin typeface="Helvetica" pitchFamily="2" charset="0"/>
+            </a:endParaRPr>
+          </a:p>
+        </p:txBody>
+      </p:sp>
+      <p:sp>
+        <p:nvSpPr>
+          <p:cNvPr id="24" name="TextBox 23">
+            <a:extLst>
+              <a:ext uri="{FF2B5EF4-FFF2-40B4-BE49-F238E27FC236}">
+                <a16:creationId xmlns:a16="http://schemas.microsoft.com/office/drawing/2014/main" id="{9929867B-4B79-61BB-41AF-F68EEEE08551}"/>
+              </a:ext>
+            </a:extLst>
+          </p:cNvPr>
+          <p:cNvSpPr txBox="1"/>
+          <p:nvPr/>
+        </p:nvSpPr>
+        <p:spPr>
+          <a:xfrm>
+            <a:off x="2005624" y="2635429"/>
+            <a:ext cx="824922" cy="437236"/>
+          </a:xfrm>
+          <a:prstGeom prst="rect">
+            <a:avLst/>
+          </a:prstGeom>
+          <a:noFill/>
+        </p:spPr>
+        <p:txBody>
+          <a:bodyPr wrap="square">
+            <a:spAutoFit/>
+          </a:bodyPr>
+          <a:lstStyle/>
+          <a:p>
+            <a:pPr algn="ctr"/>
+            <a:r>
+              <a:rPr lang="en-US" sz="747" b="1" dirty="0">
+                <a:latin typeface="Helvetica" pitchFamily="2" charset="0"/>
+                <a:ea typeface="Times New Roman" panose="02020603050405020304" pitchFamily="18" charset="0"/>
+                <a:cs typeface="Arial" panose="020B0604020202020204" pitchFamily="34" charset="0"/>
+              </a:rPr>
+              <a:t>Nonsignificant</a:t>
+            </a:r>
+          </a:p>
+          <a:p>
+            <a:pPr algn="ctr"/>
+            <a:endParaRPr lang="en-US" sz="747" dirty="0">
+              <a:latin typeface="Helvetica" pitchFamily="2" charset="0"/>
+            </a:endParaRPr>
+          </a:p>
+        </p:txBody>
+      </p:sp>
+      <p:sp>
+        <p:nvSpPr>
+          <p:cNvPr id="25" name="TextBox 24">
+            <a:extLst>
+              <a:ext uri="{FF2B5EF4-FFF2-40B4-BE49-F238E27FC236}">
+                <a16:creationId xmlns:a16="http://schemas.microsoft.com/office/drawing/2014/main" id="{FCC5FC81-CE99-7E26-C157-1B0C5BC44020}"/>
+              </a:ext>
+            </a:extLst>
+          </p:cNvPr>
+          <p:cNvSpPr txBox="1"/>
+          <p:nvPr/>
+        </p:nvSpPr>
+        <p:spPr>
+          <a:xfrm>
+            <a:off x="1877243" y="2419503"/>
+            <a:ext cx="824922" cy="322268"/>
+          </a:xfrm>
+          <a:prstGeom prst="rect">
+            <a:avLst/>
+          </a:prstGeom>
+          <a:noFill/>
+        </p:spPr>
+        <p:txBody>
+          <a:bodyPr wrap="square">
+            <a:spAutoFit/>
+          </a:bodyPr>
+          <a:lstStyle/>
+          <a:p>
+            <a:pPr algn="ctr"/>
+            <a:r>
+              <a:rPr lang="en-US" sz="747" b="1" dirty="0">
+                <a:latin typeface="Helvetica" pitchFamily="2" charset="0"/>
+                <a:ea typeface="Times New Roman" panose="02020603050405020304" pitchFamily="18" charset="0"/>
+                <a:cs typeface="Arial" panose="020B0604020202020204" pitchFamily="34" charset="0"/>
+              </a:rPr>
+              <a:t>Negative</a:t>
+            </a:r>
+          </a:p>
+          <a:p>
+            <a:pPr algn="ctr"/>
+            <a:endParaRPr lang="en-US" sz="747" dirty="0">
+              <a:latin typeface="Helvetica" pitchFamily="2" charset="0"/>
+            </a:endParaRPr>
+          </a:p>
+        </p:txBody>
+      </p:sp>
+      <p:sp>
+        <p:nvSpPr>
+          <p:cNvPr id="29" name="Rectangle 28">
+            <a:extLst>
+              <a:ext uri="{FF2B5EF4-FFF2-40B4-BE49-F238E27FC236}">
+                <a16:creationId xmlns:a16="http://schemas.microsoft.com/office/drawing/2014/main" id="{6334C501-E3B3-00A4-FDC8-2E237627F9E6}"/>
+              </a:ext>
+            </a:extLst>
+          </p:cNvPr>
+          <p:cNvSpPr/>
+          <p:nvPr/>
+        </p:nvSpPr>
+        <p:spPr>
+          <a:xfrm>
+            <a:off x="1934724" y="2389075"/>
+            <a:ext cx="877116" cy="657429"/>
+          </a:xfrm>
+          <a:prstGeom prst="rect">
+            <a:avLst/>
+          </a:prstGeom>
+          <a:noFill/>
+          <a:ln>
+            <a:solidFill>
+              <a:schemeClr val="tx1"/>
+            </a:solidFill>
+          </a:ln>
+        </p:spPr>
+        <p:style>
+          <a:lnRef idx="2">
+            <a:schemeClr val="accent1">
+              <a:shade val="15000"/>
+            </a:schemeClr>
+          </a:lnRef>
+          <a:fillRef idx="1">
+            <a:schemeClr val="accent1"/>
+          </a:fillRef>
+          <a:effectRef idx="0">
+            <a:schemeClr val="accent1"/>
+          </a:effectRef>
+          <a:fontRef idx="minor">
+            <a:schemeClr val="lt1"/>
+          </a:fontRef>
+        </p:style>
+        <p:txBody>
+          <a:bodyPr rtlCol="0" anchor="ctr"/>
+          <a:lstStyle/>
+          <a:p>
+            <a:pPr algn="ctr"/>
+            <a:endParaRPr lang="en-US" sz="960"/>
+          </a:p>
+        </p:txBody>
+      </p:sp>
+    </p:spTree>
+    <p:extLst>
+      <p:ext uri="{BB962C8B-B14F-4D97-AF65-F5344CB8AC3E}">
+        <p14:creationId xmlns:p14="http://schemas.microsoft.com/office/powerpoint/2010/main" val="3136792406"/>
       </p:ext>
     </p:extLst>
   </p:cSld>
@@ -3613,4 +5421,319 @@
     </a:ext>
   </a:extLst>
 </a:theme>
+</file>
+
+<file path=ppt/theme/theme2.xml><?xml version="1.0" encoding="utf-8"?>
+<a:theme xmlns:a="http://schemas.openxmlformats.org/drawingml/2006/main" name="Office Theme">
+  <a:themeElements>
+    <a:clrScheme name="Office">
+      <a:dk1>
+        <a:sysClr val="windowText" lastClr="000000"/>
+      </a:dk1>
+      <a:lt1>
+        <a:sysClr val="window" lastClr="FFFFFF"/>
+      </a:lt1>
+      <a:dk2>
+        <a:srgbClr val="0E2841"/>
+      </a:dk2>
+      <a:lt2>
+        <a:srgbClr val="E8E8E8"/>
+      </a:lt2>
+      <a:accent1>
+        <a:srgbClr val="156082"/>
+      </a:accent1>
+      <a:accent2>
+        <a:srgbClr val="E97132"/>
+      </a:accent2>
+      <a:accent3>
+        <a:srgbClr val="196B24"/>
+      </a:accent3>
+      <a:accent4>
+        <a:srgbClr val="0F9ED5"/>
+      </a:accent4>
+      <a:accent5>
+        <a:srgbClr val="A02B93"/>
+      </a:accent5>
+      <a:accent6>
+        <a:srgbClr val="4EA72E"/>
+      </a:accent6>
+      <a:hlink>
+        <a:srgbClr val="467886"/>
+      </a:hlink>
+      <a:folHlink>
+        <a:srgbClr val="96607D"/>
+      </a:folHlink>
+    </a:clrScheme>
+    <a:fontScheme name="Office">
+      <a:majorFont>
+        <a:latin typeface="Aptos Display" panose="02110004020202020204"/>
+        <a:ea typeface=""/>
+        <a:cs typeface=""/>
+        <a:font script="Jpan" typeface="游ゴシック Light"/>
+        <a:font script="Hang" typeface="맑은 고딕"/>
+        <a:font script="Hans" typeface="等线 Light"/>
+        <a:font script="Hant" typeface="新細明體"/>
+        <a:font script="Arab" typeface="Times New Roman"/>
+        <a:font script="Hebr" typeface="Times New Roman"/>
+        <a:font script="Thai" typeface="Angsana New"/>
+        <a:font script="Ethi" typeface="Nyala"/>
+        <a:font script="Beng" typeface="Vrinda"/>
+        <a:font script="Gujr" typeface="Shruti"/>
+        <a:font script="Khmr" typeface="MoolBoran"/>
+        <a:font script="Knda" typeface="Tunga"/>
+        <a:font script="Guru" typeface="Raavi"/>
+        <a:font script="Cans" typeface="Euphemia"/>
+        <a:font script="Cher" typeface="Plantagenet Cherokee"/>
+        <a:font script="Yiii" typeface="Microsoft Yi Baiti"/>
+        <a:font script="Tibt" typeface="Microsoft Himalaya"/>
+        <a:font script="Thaa" typeface="MV Boli"/>
+        <a:font script="Deva" typeface="Mangal"/>
+        <a:font script="Telu" typeface="Gautami"/>
+        <a:font script="Taml" typeface="Latha"/>
+        <a:font script="Syrc" typeface="Estrangelo Edessa"/>
+        <a:font script="Orya" typeface="Kalinga"/>
+        <a:font script="Mlym" typeface="Kartika"/>
+        <a:font script="Laoo" typeface="DokChampa"/>
+        <a:font script="Sinh" typeface="Iskoola Pota"/>
+        <a:font script="Mong" typeface="Mongolian Baiti"/>
+        <a:font script="Viet" typeface="Times New Roman"/>
+        <a:font script="Uigh" typeface="Microsoft Uighur"/>
+        <a:font script="Geor" typeface="Sylfaen"/>
+        <a:font script="Armn" typeface="Arial"/>
+        <a:font script="Bugi" typeface="Leelawadee UI"/>
+        <a:font script="Bopo" typeface="Microsoft JhengHei"/>
+        <a:font script="Java" typeface="Javanese Text"/>
+        <a:font script="Lisu" typeface="Segoe UI"/>
+        <a:font script="Mymr" typeface="Myanmar Text"/>
+        <a:font script="Nkoo" typeface="Ebrima"/>
+        <a:font script="Olck" typeface="Nirmala UI"/>
+        <a:font script="Osma" typeface="Ebrima"/>
+        <a:font script="Phag" typeface="Phagspa"/>
+        <a:font script="Syrn" typeface="Estrangelo Edessa"/>
+        <a:font script="Syrj" typeface="Estrangelo Edessa"/>
+        <a:font script="Syre" typeface="Estrangelo Edessa"/>
+        <a:font script="Sora" typeface="Nirmala UI"/>
+        <a:font script="Tale" typeface="Microsoft Tai Le"/>
+        <a:font script="Talu" typeface="Microsoft New Tai Lue"/>
+        <a:font script="Tfng" typeface="Ebrima"/>
+      </a:majorFont>
+      <a:minorFont>
+        <a:latin typeface="Aptos" panose="02110004020202020204"/>
+        <a:ea typeface=""/>
+        <a:cs typeface=""/>
+        <a:font script="Jpan" typeface="游ゴシック"/>
+        <a:font script="Hang" typeface="맑은 고딕"/>
+        <a:font script="Hans" typeface="等线"/>
+        <a:font script="Hant" typeface="新細明體"/>
+        <a:font script="Arab" typeface="Arial"/>
+        <a:font script="Hebr" typeface="Arial"/>
+        <a:font script="Thai" typeface="Cordia New"/>
+        <a:font script="Ethi" typeface="Nyala"/>
+        <a:font script="Beng" typeface="Vrinda"/>
+        <a:font script="Gujr" typeface="Shruti"/>
+        <a:font script="Khmr" typeface="DaunPenh"/>
+        <a:font script="Knda" typeface="Tunga"/>
+        <a:font script="Guru" typeface="Raavi"/>
+        <a:font script="Cans" typeface="Euphemia"/>
+        <a:font script="Cher" typeface="Plantagenet Cherokee"/>
+        <a:font script="Yiii" typeface="Microsoft Yi Baiti"/>
+        <a:font script="Tibt" typeface="Microsoft Himalaya"/>
+        <a:font script="Thaa" typeface="MV Boli"/>
+        <a:font script="Deva" typeface="Mangal"/>
+        <a:font script="Telu" typeface="Gautami"/>
+        <a:font script="Taml" typeface="Latha"/>
+        <a:font script="Syrc" typeface="Estrangelo Edessa"/>
+        <a:font script="Orya" typeface="Kalinga"/>
+        <a:font script="Mlym" typeface="Kartika"/>
+        <a:font script="Laoo" typeface="DokChampa"/>
+        <a:font script="Sinh" typeface="Iskoola Pota"/>
+        <a:font script="Mong" typeface="Mongolian Baiti"/>
+        <a:font script="Viet" typeface="Arial"/>
+        <a:font script="Uigh" typeface="Microsoft Uighur"/>
+        <a:font script="Geor" typeface="Sylfaen"/>
+        <a:font script="Armn" typeface="Arial"/>
+        <a:font script="Bugi" typeface="Leelawadee UI"/>
+        <a:font script="Bopo" typeface="Microsoft JhengHei"/>
+        <a:font script="Java" typeface="Javanese Text"/>
+        <a:font script="Lisu" typeface="Segoe UI"/>
+        <a:font script="Mymr" typeface="Myanmar Text"/>
+        <a:font script="Nkoo" typeface="Ebrima"/>
+        <a:font script="Olck" typeface="Nirmala UI"/>
+        <a:font script="Osma" typeface="Ebrima"/>
+        <a:font script="Phag" typeface="Phagspa"/>
+        <a:font script="Syrn" typeface="Estrangelo Edessa"/>
+        <a:font script="Syrj" typeface="Estrangelo Edessa"/>
+        <a:font script="Syre" typeface="Estrangelo Edessa"/>
+        <a:font script="Sora" typeface="Nirmala UI"/>
+        <a:font script="Tale" typeface="Microsoft Tai Le"/>
+        <a:font script="Talu" typeface="Microsoft New Tai Lue"/>
+        <a:font script="Tfng" typeface="Ebrima"/>
+      </a:minorFont>
+    </a:fontScheme>
+    <a:fmtScheme name="Office">
+      <a:fillStyleLst>
+        <a:solidFill>
+          <a:schemeClr val="phClr"/>
+        </a:solidFill>
+        <a:gradFill rotWithShape="1">
+          <a:gsLst>
+            <a:gs pos="0">
+              <a:schemeClr val="phClr">
+                <a:lumMod val="110000"/>
+                <a:satMod val="105000"/>
+                <a:tint val="67000"/>
+              </a:schemeClr>
+            </a:gs>
+            <a:gs pos="50000">
+              <a:schemeClr val="phClr">
+                <a:lumMod val="105000"/>
+                <a:satMod val="103000"/>
+                <a:tint val="73000"/>
+              </a:schemeClr>
+            </a:gs>
+            <a:gs pos="100000">
+              <a:schemeClr val="phClr">
+                <a:lumMod val="105000"/>
+                <a:satMod val="109000"/>
+                <a:tint val="81000"/>
+              </a:schemeClr>
+            </a:gs>
+          </a:gsLst>
+          <a:lin ang="5400000" scaled="0"/>
+        </a:gradFill>
+        <a:gradFill rotWithShape="1">
+          <a:gsLst>
+            <a:gs pos="0">
+              <a:schemeClr val="phClr">
+                <a:satMod val="103000"/>
+                <a:lumMod val="102000"/>
+                <a:tint val="94000"/>
+              </a:schemeClr>
+            </a:gs>
+            <a:gs pos="50000">
+              <a:schemeClr val="phClr">
+                <a:satMod val="110000"/>
+                <a:lumMod val="100000"/>
+                <a:shade val="100000"/>
+              </a:schemeClr>
+            </a:gs>
+            <a:gs pos="100000">
+              <a:schemeClr val="phClr">
+                <a:lumMod val="99000"/>
+                <a:satMod val="120000"/>
+                <a:shade val="78000"/>
+              </a:schemeClr>
+            </a:gs>
+          </a:gsLst>
+          <a:lin ang="5400000" scaled="0"/>
+        </a:gradFill>
+      </a:fillStyleLst>
+      <a:lnStyleLst>
+        <a:ln w="12700" cap="flat" cmpd="sng" algn="ctr">
+          <a:solidFill>
+            <a:schemeClr val="phClr"/>
+          </a:solidFill>
+          <a:prstDash val="solid"/>
+          <a:miter lim="800000"/>
+        </a:ln>
+        <a:ln w="19050" cap="flat" cmpd="sng" algn="ctr">
+          <a:solidFill>
+            <a:schemeClr val="phClr"/>
+          </a:solidFill>
+          <a:prstDash val="solid"/>
+          <a:miter lim="800000"/>
+        </a:ln>
+        <a:ln w="25400" cap="flat" cmpd="sng" algn="ctr">
+          <a:solidFill>
+            <a:schemeClr val="phClr"/>
+          </a:solidFill>
+          <a:prstDash val="solid"/>
+          <a:miter lim="800000"/>
+        </a:ln>
+      </a:lnStyleLst>
+      <a:effectStyleLst>
+        <a:effectStyle>
+          <a:effectLst/>
+        </a:effectStyle>
+        <a:effectStyle>
+          <a:effectLst/>
+        </a:effectStyle>
+        <a:effectStyle>
+          <a:effectLst>
+            <a:outerShdw blurRad="57150" dist="19050" dir="5400000" algn="ctr" rotWithShape="0">
+              <a:srgbClr val="000000">
+                <a:alpha val="63000"/>
+              </a:srgbClr>
+            </a:outerShdw>
+          </a:effectLst>
+        </a:effectStyle>
+      </a:effectStyleLst>
+      <a:bgFillStyleLst>
+        <a:solidFill>
+          <a:schemeClr val="phClr"/>
+        </a:solidFill>
+        <a:solidFill>
+          <a:schemeClr val="phClr">
+            <a:tint val="95000"/>
+            <a:satMod val="170000"/>
+          </a:schemeClr>
+        </a:solidFill>
+        <a:gradFill rotWithShape="1">
+          <a:gsLst>
+            <a:gs pos="0">
+              <a:schemeClr val="phClr">
+                <a:tint val="93000"/>
+                <a:satMod val="150000"/>
+                <a:shade val="98000"/>
+                <a:lumMod val="102000"/>
+              </a:schemeClr>
+            </a:gs>
+            <a:gs pos="50000">
+              <a:schemeClr val="phClr">
+                <a:tint val="98000"/>
+                <a:satMod val="130000"/>
+                <a:shade val="90000"/>
+                <a:lumMod val="103000"/>
+              </a:schemeClr>
+            </a:gs>
+            <a:gs pos="100000">
+              <a:schemeClr val="phClr">
+                <a:shade val="63000"/>
+                <a:satMod val="120000"/>
+              </a:schemeClr>
+            </a:gs>
+          </a:gsLst>
+          <a:lin ang="5400000" scaled="0"/>
+        </a:gradFill>
+      </a:bgFillStyleLst>
+    </a:fmtScheme>
+  </a:themeElements>
+  <a:objectDefaults>
+    <a:lnDef>
+      <a:spPr/>
+      <a:bodyPr/>
+      <a:lstStyle/>
+      <a:style>
+        <a:lnRef idx="2">
+          <a:schemeClr val="accent1"/>
+        </a:lnRef>
+        <a:fillRef idx="0">
+          <a:schemeClr val="accent1"/>
+        </a:fillRef>
+        <a:effectRef idx="1">
+          <a:schemeClr val="accent1"/>
+        </a:effectRef>
+        <a:fontRef idx="minor">
+          <a:schemeClr val="tx1"/>
+        </a:fontRef>
+      </a:style>
+    </a:lnDef>
+  </a:objectDefaults>
+  <a:extraClrSchemeLst/>
+  <a:extLst>
+    <a:ext uri="{05A4C25C-085E-4340-85A3-A5531E510DB2}">
+      <thm15:themeFamily xmlns:thm15="http://schemas.microsoft.com/office/thememl/2012/main" name="Office Theme" id="{2E142A2C-CD16-42D6-873A-C26D2A0506FA}" vid="{1BDDFF52-6CD6-40A5-AB3C-68EB2F1E4D0A}"/>
+    </a:ext>
+  </a:extLst>
+</a:theme>
 </file>
</xml_diff>